<commit_message>
minor updates, added pending work
</commit_message>
<xml_diff>
--- a/Documentation/Increment3/PPT/Increment 3 -  Smart Shopping.pptx
+++ b/Documentation/Increment3/PPT/Increment 3 -  Smart Shopping.pptx
@@ -16,6 +16,7 @@
     <p:sldId id="261" r:id="rId13"/>
     <p:sldId id="262" r:id="rId14"/>
     <p:sldId id="263" r:id="rId15"/>
+    <p:sldId id="264" r:id="rId16"/>
   </p:sldIdLst>
   <p:sldSz cx="9144000" cy="6858000"/>
   <p:notesSz cx="6858000" cy="9144000"/>
@@ -4383,7 +4384,7 @@
           <a:p>
             <a:pPr/>
             <a:r>
-              <a:t>Issues</a:t>
+              <a:t>Issues faced</a:t>
             </a:r>
           </a:p>
         </p:txBody>
@@ -4416,9 +4417,15 @@
           </a:p>
           <a:p>
             <a:pPr/>
+          </a:p>
+          <a:p>
+            <a:pPr/>
             <a:r>
               <a:t>Navigation from Unity to Android</a:t>
             </a:r>
+          </a:p>
+          <a:p>
+            <a:pPr/>
           </a:p>
           <a:p>
             <a:pPr/>
@@ -4463,6 +4470,102 @@
           </p:nvPr>
         </p:nvSpPr>
         <p:spPr>
+          <a:prstGeom prst="rect">
+            <a:avLst/>
+          </a:prstGeom>
+        </p:spPr>
+        <p:txBody>
+          <a:bodyPr/>
+          <a:lstStyle/>
+          <a:p>
+            <a:pPr/>
+            <a:r>
+              <a:t>Pending Work</a:t>
+            </a:r>
+          </a:p>
+        </p:txBody>
+      </p:sp>
+      <p:sp>
+        <p:nvSpPr>
+          <p:cNvPr id="136" name="Content Placeholder 2"/>
+          <p:cNvSpPr txBox="1"/>
+          <p:nvPr>
+            <p:ph type="body" idx="1"/>
+          </p:nvPr>
+        </p:nvSpPr>
+        <p:spPr>
+          <a:xfrm>
+            <a:off x="457200" y="1600200"/>
+            <a:ext cx="7467600" cy="4525963"/>
+          </a:xfrm>
+          <a:prstGeom prst="rect">
+            <a:avLst/>
+          </a:prstGeom>
+        </p:spPr>
+        <p:txBody>
+          <a:bodyPr/>
+          <a:lstStyle/>
+          <a:p>
+            <a:pPr/>
+            <a:r>
+              <a:t>Making the UI more appealing.</a:t>
+            </a:r>
+          </a:p>
+          <a:p>
+            <a:pPr/>
+          </a:p>
+          <a:p>
+            <a:pPr/>
+            <a:r>
+              <a:t>Adding store location with Google maps if, time allows</a:t>
+            </a:r>
+          </a:p>
+          <a:p>
+            <a:pPr/>
+          </a:p>
+          <a:p>
+            <a:pPr/>
+            <a:r>
+              <a:t>Social Media Integration</a:t>
+            </a:r>
+          </a:p>
+        </p:txBody>
+      </p:sp>
+    </p:spTree>
+  </p:cSld>
+  <p:clrMapOvr>
+    <a:masterClrMapping/>
+  </p:clrMapOvr>
+  <p:transition xmlns:p14="http://schemas.microsoft.com/office/powerpoint/2010/main" spd="med" advClick="1"/>
+</p:sld>
+</file>
+
+<file path=ppt/slides/slide8.xml><?xml version="1.0" encoding="utf-8"?>
+<p:sld xmlns:a="http://schemas.openxmlformats.org/drawingml/2006/main" xmlns:r="http://schemas.openxmlformats.org/officeDocument/2006/relationships" xmlns:p="http://schemas.openxmlformats.org/presentationml/2006/main" showMasterSp="1" showMasterPhAnim="1">
+  <p:cSld>
+    <p:spTree>
+      <p:nvGrpSpPr>
+        <p:cNvPr id="1" name=""/>
+        <p:cNvGrpSpPr/>
+        <p:nvPr/>
+      </p:nvGrpSpPr>
+      <p:grpSpPr>
+        <a:xfrm>
+          <a:off x="0" y="0"/>
+          <a:ext cx="0" cy="0"/>
+          <a:chOff x="0" y="0"/>
+          <a:chExt cx="0" cy="0"/>
+        </a:xfrm>
+      </p:grpSpPr>
+      <p:sp>
+        <p:nvSpPr>
+          <p:cNvPr id="138" name="Title 1"/>
+          <p:cNvSpPr txBox="1"/>
+          <p:nvPr>
+            <p:ph type="title"/>
+          </p:nvPr>
+        </p:nvSpPr>
+        <p:spPr>
           <a:xfrm>
             <a:off x="101600" y="122238"/>
             <a:ext cx="3648274" cy="1143001"/>
@@ -4494,7 +4597,7 @@
       </p:sp>
       <p:grpSp>
         <p:nvGrpSpPr>
-          <p:cNvPr id="143" name="Group"/>
+          <p:cNvPr id="146" name="Group"/>
           <p:cNvGrpSpPr/>
           <p:nvPr/>
         </p:nvGrpSpPr>
@@ -4508,7 +4611,7 @@
         </p:grpSpPr>
         <p:pic>
           <p:nvPicPr>
-            <p:cNvPr id="136" name="Image" descr="Image"/>
+            <p:cNvPr id="139" name="Image" descr="Image"/>
             <p:cNvPicPr>
               <a:picLocks noChangeAspect="1"/>
             </p:cNvPicPr>
@@ -4539,7 +4642,7 @@
         </p:pic>
         <p:pic>
           <p:nvPicPr>
-            <p:cNvPr id="137" name="Image" descr="Image"/>
+            <p:cNvPr id="140" name="Image" descr="Image"/>
             <p:cNvPicPr>
               <a:picLocks noChangeAspect="1"/>
             </p:cNvPicPr>
@@ -4570,7 +4673,7 @@
         </p:pic>
         <p:pic>
           <p:nvPicPr>
-            <p:cNvPr id="138" name="Image" descr="Image"/>
+            <p:cNvPr id="141" name="Image" descr="Image"/>
             <p:cNvPicPr>
               <a:picLocks noChangeAspect="1"/>
             </p:cNvPicPr>
@@ -4601,7 +4704,7 @@
         </p:pic>
         <p:pic>
           <p:nvPicPr>
-            <p:cNvPr id="139" name="Image" descr="Image"/>
+            <p:cNvPr id="142" name="Image" descr="Image"/>
             <p:cNvPicPr>
               <a:picLocks noChangeAspect="1"/>
             </p:cNvPicPr>
@@ -4632,7 +4735,7 @@
         </p:pic>
         <p:pic>
           <p:nvPicPr>
-            <p:cNvPr id="140" name="Image" descr="Image"/>
+            <p:cNvPr id="143" name="Image" descr="Image"/>
             <p:cNvPicPr>
               <a:picLocks noChangeAspect="1"/>
             </p:cNvPicPr>
@@ -4663,7 +4766,7 @@
         </p:pic>
         <p:pic>
           <p:nvPicPr>
-            <p:cNvPr id="141" name="Image" descr="Image"/>
+            <p:cNvPr id="144" name="Image" descr="Image"/>
             <p:cNvPicPr>
               <a:picLocks noChangeAspect="1"/>
             </p:cNvPicPr>
@@ -4694,7 +4797,7 @@
         </p:pic>
         <p:pic>
           <p:nvPicPr>
-            <p:cNvPr id="142" name="Image" descr="Image"/>
+            <p:cNvPr id="145" name="Image" descr="Image"/>
             <p:cNvPicPr>
               <a:picLocks noChangeAspect="1"/>
             </p:cNvPicPr>
@@ -4733,7 +4836,7 @@
 </p:sld>
 </file>
 
-<file path=ppt/slides/slide8.xml><?xml version="1.0" encoding="utf-8"?>
+<file path=ppt/slides/slide9.xml><?xml version="1.0" encoding="utf-8"?>
 <p:sld xmlns:a="http://schemas.openxmlformats.org/drawingml/2006/main" xmlns:r="http://schemas.openxmlformats.org/officeDocument/2006/relationships" xmlns:p="http://schemas.openxmlformats.org/presentationml/2006/main" showMasterSp="1" showMasterPhAnim="1">
   <p:cSld>
     <p:spTree>
@@ -4752,7 +4855,7 @@
       </p:grpSpPr>
       <p:sp>
         <p:nvSpPr>
-          <p:cNvPr id="145" name="Title 1"/>
+          <p:cNvPr id="148" name="Title 1"/>
           <p:cNvSpPr txBox="1"/>
           <p:nvPr>
             <p:ph type="title"/>
@@ -4776,7 +4879,7 @@
       </p:sp>
       <p:sp>
         <p:nvSpPr>
-          <p:cNvPr id="146" name="Content Placeholder 2"/>
+          <p:cNvPr id="149" name="Content Placeholder 2"/>
           <p:cNvSpPr txBox="1"/>
           <p:nvPr>
             <p:ph type="body" idx="1"/>
@@ -4795,7 +4898,19 @@
           <a:bodyPr/>
           <a:lstStyle/>
           <a:p>
-            <a:pPr/>
+            <a:pPr marL="349117" indent="-318759" defTabSz="758951">
+              <a:spcBef>
+                <a:spcPts val="500"/>
+              </a:spcBef>
+              <a:defRPr sz="2490"/>
+            </a:pPr>
+            <a:r>
+              <a:rPr u="sng"/>
+              <a:t>Indix API:</a:t>
+            </a:r>
+            <a:r>
+              <a:t> </a:t>
+            </a:r>
             <a:r>
               <a:rPr>
                 <a:uFill>
@@ -4809,7 +4924,19 @@
             </a:r>
           </a:p>
           <a:p>
-            <a:pPr/>
+            <a:pPr marL="349117" indent="-318759" defTabSz="758951">
+              <a:spcBef>
+                <a:spcPts val="500"/>
+              </a:spcBef>
+              <a:defRPr sz="2490"/>
+            </a:pPr>
+            <a:r>
+              <a:rPr u="sng"/>
+              <a:t>Unity tutorials:</a:t>
+            </a:r>
+            <a:r>
+              <a:t> </a:t>
+            </a:r>
             <a:r>
               <a:rPr>
                 <a:uFill>
@@ -4823,7 +4950,19 @@
             </a:r>
           </a:p>
           <a:p>
-            <a:pPr/>
+            <a:pPr marL="349117" indent="-318759" defTabSz="758951">
+              <a:spcBef>
+                <a:spcPts val="500"/>
+              </a:spcBef>
+              <a:defRPr sz="2490"/>
+            </a:pPr>
+            <a:r>
+              <a:rPr u="sng"/>
+              <a:t>Twitter developer console:</a:t>
+            </a:r>
+            <a:r>
+              <a:t> </a:t>
+            </a:r>
             <a:r>
               <a:rPr>
                 <a:uFill>
@@ -4837,7 +4976,19 @@
             </a:r>
           </a:p>
           <a:p>
-            <a:pPr/>
+            <a:pPr marL="349117" indent="-318759" defTabSz="758951">
+              <a:spcBef>
+                <a:spcPts val="500"/>
+              </a:spcBef>
+              <a:defRPr sz="2490"/>
+            </a:pPr>
+            <a:r>
+              <a:rPr u="sng"/>
+              <a:t>Google vision API:</a:t>
+            </a:r>
+            <a:r>
+              <a:t> </a:t>
+            </a:r>
             <a:r>
               <a:rPr>
                 <a:uFill>
@@ -4851,7 +5002,16 @@
             </a:r>
           </a:p>
           <a:p>
-            <a:pPr/>
+            <a:pPr marL="349117" indent="-318759" defTabSz="758951">
+              <a:spcBef>
+                <a:spcPts val="500"/>
+              </a:spcBef>
+              <a:defRPr sz="2490"/>
+            </a:pPr>
+            <a:r>
+              <a:rPr u="sng"/>
+              <a:t>Firebase Authentication: </a:t>
+            </a:r>
             <a:r>
               <a:rPr>
                 <a:uFill>

</xml_diff>